<commit_message>
highlight doctor Rx'd values, regex thc & cbd
</commit_message>
<xml_diff>
--- a/HC cannabis Rx.pptx
+++ b/HC cannabis Rx.pptx
@@ -5,18 +5,20 @@
     <p:sldMasterId id="2147483648" r:id="rId1"/>
   </p:sldMasterIdLst>
   <p:notesMasterIdLst>
-    <p:notesMasterId r:id="rId11"/>
+    <p:notesMasterId r:id="rId13"/>
   </p:notesMasterIdLst>
   <p:sldIdLst>
     <p:sldId id="256" r:id="rId2"/>
     <p:sldId id="257" r:id="rId3"/>
-    <p:sldId id="264" r:id="rId4"/>
-    <p:sldId id="263" r:id="rId5"/>
-    <p:sldId id="258" r:id="rId6"/>
-    <p:sldId id="259" r:id="rId7"/>
-    <p:sldId id="260" r:id="rId8"/>
-    <p:sldId id="261" r:id="rId9"/>
-    <p:sldId id="262" r:id="rId10"/>
+    <p:sldId id="265" r:id="rId4"/>
+    <p:sldId id="266" r:id="rId5"/>
+    <p:sldId id="264" r:id="rId6"/>
+    <p:sldId id="263" r:id="rId7"/>
+    <p:sldId id="258" r:id="rId8"/>
+    <p:sldId id="259" r:id="rId9"/>
+    <p:sldId id="260" r:id="rId10"/>
+    <p:sldId id="261" r:id="rId11"/>
+    <p:sldId id="262" r:id="rId12"/>
   </p:sldIdLst>
   <p:sldSz cx="12192000" cy="6858000"/>
   <p:notesSz cx="6858000" cy="9144000"/>
@@ -115,15 +117,80 @@
       </a:defRPr>
     </a:lvl9pPr>
   </p:defaultTextStyle>
+  <p:extLst>
+    <p:ext uri="{EFAFB233-063F-42B5-8137-9DF3F51BA10A}">
+      <p15:sldGuideLst xmlns:p15="http://schemas.microsoft.com/office/powerpoint/2012/main"/>
+    </p:ext>
+  </p:extLst>
 </p:presentation>
 </file>
 
 <file path=ppt/revisionInfo.xml><?xml version="1.0" encoding="utf-8"?>
 <p1510:revInfo xmlns:a="http://schemas.openxmlformats.org/drawingml/2006/main" xmlns:r="http://schemas.openxmlformats.org/officeDocument/2006/relationships" xmlns:p1510="http://schemas.microsoft.com/office/powerpoint/2015/10/main">
   <p1510:revLst>
-    <p1510:client id="{DFE512E9-F487-F14D-ACE1-C7828906F4C8}" v="18" dt="2019-12-10T01:28:18.153"/>
+    <p1510:client id="{D9A4A140-E193-C04B-A0D9-432644840A51}" v="23" dt="2020-01-18T13:03:56.461"/>
   </p1510:revLst>
 </p1510:revInfo>
+</file>
+
+<file path=ppt/changesInfos/changesInfo1.xml><?xml version="1.0" encoding="utf-8"?>
+<pc:chgInfo xmlns:a="http://schemas.openxmlformats.org/drawingml/2006/main" xmlns:r="http://schemas.openxmlformats.org/officeDocument/2006/relationships" xmlns:ac="http://schemas.microsoft.com/office/drawing/2013/main/command" xmlns:pc="http://schemas.microsoft.com/office/powerpoint/2013/main/command">
+  <pc:docChgLst>
+    <pc:chgData name="Adam Cole" userId="725ce5a55aa425b7" providerId="LiveId" clId="{D9A4A140-E193-C04B-A0D9-432644840A51}"/>
+    <pc:docChg chg="undo custSel addSld modSld">
+      <pc:chgData name="Adam Cole" userId="725ce5a55aa425b7" providerId="LiveId" clId="{D9A4A140-E193-C04B-A0D9-432644840A51}" dt="2020-01-18T13:04:26.163" v="343" actId="20577"/>
+      <pc:docMkLst>
+        <pc:docMk/>
+      </pc:docMkLst>
+      <pc:sldChg chg="modSp add">
+        <pc:chgData name="Adam Cole" userId="725ce5a55aa425b7" providerId="LiveId" clId="{D9A4A140-E193-C04B-A0D9-432644840A51}" dt="2020-01-18T13:03:27.747" v="296" actId="27636"/>
+        <pc:sldMkLst>
+          <pc:docMk/>
+          <pc:sldMk cId="2106660363" sldId="265"/>
+        </pc:sldMkLst>
+        <pc:spChg chg="mod">
+          <ac:chgData name="Adam Cole" userId="725ce5a55aa425b7" providerId="LiveId" clId="{D9A4A140-E193-C04B-A0D9-432644840A51}" dt="2020-01-18T12:52:04.508" v="44" actId="1035"/>
+          <ac:spMkLst>
+            <pc:docMk/>
+            <pc:sldMk cId="2106660363" sldId="265"/>
+            <ac:spMk id="2" creationId="{7312C6C0-04E5-294C-A93C-BA94E5B4ED1C}"/>
+          </ac:spMkLst>
+        </pc:spChg>
+        <pc:spChg chg="mod">
+          <ac:chgData name="Adam Cole" userId="725ce5a55aa425b7" providerId="LiveId" clId="{D9A4A140-E193-C04B-A0D9-432644840A51}" dt="2020-01-18T13:03:27.747" v="296" actId="27636"/>
+          <ac:spMkLst>
+            <pc:docMk/>
+            <pc:sldMk cId="2106660363" sldId="265"/>
+            <ac:spMk id="3" creationId="{F4A91C9E-4D19-6941-8AF7-02141CECFFC6}"/>
+          </ac:spMkLst>
+        </pc:spChg>
+      </pc:sldChg>
+      <pc:sldChg chg="modSp add">
+        <pc:chgData name="Adam Cole" userId="725ce5a55aa425b7" providerId="LiveId" clId="{D9A4A140-E193-C04B-A0D9-432644840A51}" dt="2020-01-18T13:04:26.163" v="343" actId="20577"/>
+        <pc:sldMkLst>
+          <pc:docMk/>
+          <pc:sldMk cId="1688005659" sldId="266"/>
+        </pc:sldMkLst>
+        <pc:spChg chg="mod">
+          <ac:chgData name="Adam Cole" userId="725ce5a55aa425b7" providerId="LiveId" clId="{D9A4A140-E193-C04B-A0D9-432644840A51}" dt="2020-01-18T12:52:43.307" v="70" actId="20577"/>
+          <ac:spMkLst>
+            <pc:docMk/>
+            <pc:sldMk cId="1688005659" sldId="266"/>
+            <ac:spMk id="2" creationId="{7312C6C0-04E5-294C-A93C-BA94E5B4ED1C}"/>
+          </ac:spMkLst>
+        </pc:spChg>
+        <pc:spChg chg="mod">
+          <ac:chgData name="Adam Cole" userId="725ce5a55aa425b7" providerId="LiveId" clId="{D9A4A140-E193-C04B-A0D9-432644840A51}" dt="2020-01-18T13:04:26.163" v="343" actId="20577"/>
+          <ac:spMkLst>
+            <pc:docMk/>
+            <pc:sldMk cId="1688005659" sldId="266"/>
+            <ac:spMk id="3" creationId="{F4A91C9E-4D19-6941-8AF7-02141CECFFC6}"/>
+          </ac:spMkLst>
+        </pc:spChg>
+      </pc:sldChg>
+    </pc:docChg>
+  </pc:docChgLst>
+</pc:chgInfo>
 </file>
 
 <file path=ppt/notesMasters/notesMaster1.xml><?xml version="1.0" encoding="utf-8"?>
@@ -208,7 +275,7 @@
           <a:p>
             <a:fld id="{E0668D3B-41E7-2F45-912A-F86FE72DF2E0}" type="datetimeFigureOut">
               <a:rPr lang="en-US" smtClean="0"/>
-              <a:t>12/9/19</a:t>
+              <a:t>1/18/20</a:t>
             </a:fld>
             <a:endParaRPr lang="en-US"/>
           </a:p>
@@ -622,7 +689,7 @@
           <a:p>
             <a:fld id="{A062810D-73EE-1A48-AB32-B589B64B874A}" type="datetimeFigureOut">
               <a:rPr lang="en-US" smtClean="0"/>
-              <a:t>12/9/19</a:t>
+              <a:t>1/18/20</a:t>
             </a:fld>
             <a:endParaRPr lang="en-US"/>
           </a:p>
@@ -820,7 +887,7 @@
           <a:p>
             <a:fld id="{A062810D-73EE-1A48-AB32-B589B64B874A}" type="datetimeFigureOut">
               <a:rPr lang="en-US" smtClean="0"/>
-              <a:t>12/9/19</a:t>
+              <a:t>1/18/20</a:t>
             </a:fld>
             <a:endParaRPr lang="en-US"/>
           </a:p>
@@ -1028,7 +1095,7 @@
           <a:p>
             <a:fld id="{A062810D-73EE-1A48-AB32-B589B64B874A}" type="datetimeFigureOut">
               <a:rPr lang="en-US" smtClean="0"/>
-              <a:t>12/9/19</a:t>
+              <a:t>1/18/20</a:t>
             </a:fld>
             <a:endParaRPr lang="en-US"/>
           </a:p>
@@ -1226,7 +1293,7 @@
           <a:p>
             <a:fld id="{A062810D-73EE-1A48-AB32-B589B64B874A}" type="datetimeFigureOut">
               <a:rPr lang="en-US" smtClean="0"/>
-              <a:t>12/9/19</a:t>
+              <a:t>1/18/20</a:t>
             </a:fld>
             <a:endParaRPr lang="en-US"/>
           </a:p>
@@ -1501,7 +1568,7 @@
           <a:p>
             <a:fld id="{A062810D-73EE-1A48-AB32-B589B64B874A}" type="datetimeFigureOut">
               <a:rPr lang="en-US" smtClean="0"/>
-              <a:t>12/9/19</a:t>
+              <a:t>1/18/20</a:t>
             </a:fld>
             <a:endParaRPr lang="en-US"/>
           </a:p>
@@ -1766,7 +1833,7 @@
           <a:p>
             <a:fld id="{A062810D-73EE-1A48-AB32-B589B64B874A}" type="datetimeFigureOut">
               <a:rPr lang="en-US" smtClean="0"/>
-              <a:t>12/9/19</a:t>
+              <a:t>1/18/20</a:t>
             </a:fld>
             <a:endParaRPr lang="en-US"/>
           </a:p>
@@ -2178,7 +2245,7 @@
           <a:p>
             <a:fld id="{A062810D-73EE-1A48-AB32-B589B64B874A}" type="datetimeFigureOut">
               <a:rPr lang="en-US" smtClean="0"/>
-              <a:t>12/9/19</a:t>
+              <a:t>1/18/20</a:t>
             </a:fld>
             <a:endParaRPr lang="en-US"/>
           </a:p>
@@ -2319,7 +2386,7 @@
           <a:p>
             <a:fld id="{A062810D-73EE-1A48-AB32-B589B64B874A}" type="datetimeFigureOut">
               <a:rPr lang="en-US" smtClean="0"/>
-              <a:t>12/9/19</a:t>
+              <a:t>1/18/20</a:t>
             </a:fld>
             <a:endParaRPr lang="en-US"/>
           </a:p>
@@ -2432,7 +2499,7 @@
           <a:p>
             <a:fld id="{A062810D-73EE-1A48-AB32-B589B64B874A}" type="datetimeFigureOut">
               <a:rPr lang="en-US" smtClean="0"/>
-              <a:t>12/9/19</a:t>
+              <a:t>1/18/20</a:t>
             </a:fld>
             <a:endParaRPr lang="en-US"/>
           </a:p>
@@ -2743,7 +2810,7 @@
           <a:p>
             <a:fld id="{A062810D-73EE-1A48-AB32-B589B64B874A}" type="datetimeFigureOut">
               <a:rPr lang="en-US" smtClean="0"/>
-              <a:t>12/9/19</a:t>
+              <a:t>1/18/20</a:t>
             </a:fld>
             <a:endParaRPr lang="en-US"/>
           </a:p>
@@ -3031,7 +3098,7 @@
           <a:p>
             <a:fld id="{A062810D-73EE-1A48-AB32-B589B64B874A}" type="datetimeFigureOut">
               <a:rPr lang="en-US" smtClean="0"/>
-              <a:t>12/9/19</a:t>
+              <a:t>1/18/20</a:t>
             </a:fld>
             <a:endParaRPr lang="en-US"/>
           </a:p>
@@ -3272,7 +3339,7 @@
           <a:p>
             <a:fld id="{A062810D-73EE-1A48-AB32-B589B64B874A}" type="datetimeFigureOut">
               <a:rPr lang="en-US" smtClean="0"/>
-              <a:t>12/9/19</a:t>
+              <a:t>1/18/20</a:t>
             </a:fld>
             <a:endParaRPr lang="en-US"/>
           </a:p>
@@ -3997,6 +4064,135 @@
 </p:sld>
 </file>
 
+<file path=ppt/slides/slide10.xml><?xml version="1.0" encoding="utf-8"?>
+<p:sld xmlns:a="http://schemas.openxmlformats.org/drawingml/2006/main" xmlns:r="http://schemas.openxmlformats.org/officeDocument/2006/relationships" xmlns:p="http://schemas.openxmlformats.org/presentationml/2006/main">
+  <p:cSld>
+    <p:spTree>
+      <p:nvGrpSpPr>
+        <p:cNvPr id="1" name=""/>
+        <p:cNvGrpSpPr/>
+        <p:nvPr/>
+      </p:nvGrpSpPr>
+      <p:grpSpPr>
+        <a:xfrm>
+          <a:off x="0" y="0"/>
+          <a:ext cx="0" cy="0"/>
+          <a:chOff x="0" y="0"/>
+          <a:chExt cx="0" cy="0"/>
+        </a:xfrm>
+      </p:grpSpPr>
+      <p:pic>
+        <p:nvPicPr>
+          <p:cNvPr id="2" name="Picture 1" descr="A picture containing cabinet, screenshot&#10;&#10;Description automatically generated">
+            <a:extLst>
+              <a:ext uri="{FF2B5EF4-FFF2-40B4-BE49-F238E27FC236}">
+                <a16:creationId xmlns:a16="http://schemas.microsoft.com/office/drawing/2014/main" id="{68B15E08-AE88-1F42-BB37-607A3B619BD3}"/>
+              </a:ext>
+            </a:extLst>
+          </p:cNvPr>
+          <p:cNvPicPr/>
+          <p:nvPr/>
+        </p:nvPicPr>
+        <p:blipFill>
+          <a:blip r:embed="rId2" cstate="email">
+            <a:extLst>
+              <a:ext uri="{28A0092B-C50C-407E-A947-70E740481C1C}">
+                <a14:useLocalDpi xmlns:a14="http://schemas.microsoft.com/office/drawing/2010/main"/>
+              </a:ext>
+            </a:extLst>
+          </a:blip>
+          <a:stretch>
+            <a:fillRect/>
+          </a:stretch>
+        </p:blipFill>
+        <p:spPr>
+          <a:xfrm>
+            <a:off x="1650356" y="2106707"/>
+            <a:ext cx="8891288" cy="2644588"/>
+          </a:xfrm>
+          <a:prstGeom prst="rect">
+            <a:avLst/>
+          </a:prstGeom>
+        </p:spPr>
+      </p:pic>
+    </p:spTree>
+    <p:extLst>
+      <p:ext uri="{BB962C8B-B14F-4D97-AF65-F5344CB8AC3E}">
+        <p14:creationId xmlns:p14="http://schemas.microsoft.com/office/powerpoint/2010/main" val="955394993"/>
+      </p:ext>
+    </p:extLst>
+  </p:cSld>
+  <p:clrMapOvr>
+    <a:masterClrMapping/>
+  </p:clrMapOvr>
+</p:sld>
+</file>
+
+<file path=ppt/slides/slide11.xml><?xml version="1.0" encoding="utf-8"?>
+<p:sld xmlns:a="http://schemas.openxmlformats.org/drawingml/2006/main" xmlns:r="http://schemas.openxmlformats.org/officeDocument/2006/relationships" xmlns:p="http://schemas.openxmlformats.org/presentationml/2006/main">
+  <p:cSld>
+    <p:spTree>
+      <p:nvGrpSpPr>
+        <p:cNvPr id="1" name=""/>
+        <p:cNvGrpSpPr/>
+        <p:nvPr/>
+      </p:nvGrpSpPr>
+      <p:grpSpPr>
+        <a:xfrm>
+          <a:off x="0" y="0"/>
+          <a:ext cx="0" cy="0"/>
+          <a:chOff x="0" y="0"/>
+          <a:chExt cx="0" cy="0"/>
+        </a:xfrm>
+      </p:grpSpPr>
+      <p:pic>
+        <p:nvPicPr>
+          <p:cNvPr id="2" name="Picture 1">
+            <a:extLst>
+              <a:ext uri="{FF2B5EF4-FFF2-40B4-BE49-F238E27FC236}">
+                <a16:creationId xmlns:a16="http://schemas.microsoft.com/office/drawing/2014/main" id="{45B43790-A0AA-5E4A-8FC9-8E2E000F7563}"/>
+              </a:ext>
+            </a:extLst>
+          </p:cNvPr>
+          <p:cNvPicPr>
+            <a:picLocks noChangeAspect="1"/>
+          </p:cNvPicPr>
+          <p:nvPr/>
+        </p:nvPicPr>
+        <p:blipFill rotWithShape="1">
+          <a:blip r:embed="rId2" cstate="email">
+            <a:extLst>
+              <a:ext uri="{28A0092B-C50C-407E-A947-70E740481C1C}">
+                <a14:useLocalDpi xmlns:a14="http://schemas.microsoft.com/office/drawing/2010/main"/>
+              </a:ext>
+            </a:extLst>
+          </a:blip>
+          <a:srcRect/>
+          <a:stretch/>
+        </p:blipFill>
+        <p:spPr>
+          <a:xfrm>
+            <a:off x="1524001" y="947855"/>
+            <a:ext cx="9120556" cy="5112287"/>
+          </a:xfrm>
+          <a:prstGeom prst="rect">
+            <a:avLst/>
+          </a:prstGeom>
+        </p:spPr>
+      </p:pic>
+    </p:spTree>
+    <p:extLst>
+      <p:ext uri="{BB962C8B-B14F-4D97-AF65-F5344CB8AC3E}">
+        <p14:creationId xmlns:p14="http://schemas.microsoft.com/office/powerpoint/2010/main" val="1206427728"/>
+      </p:ext>
+    </p:extLst>
+  </p:cSld>
+  <p:clrMapOvr>
+    <a:masterClrMapping/>
+  </p:clrMapOvr>
+</p:sld>
+</file>
+
 <file path=ppt/slides/slide2.xml><?xml version="1.0" encoding="utf-8"?>
 <p:sld xmlns:a="http://schemas.openxmlformats.org/drawingml/2006/main" xmlns:r="http://schemas.openxmlformats.org/officeDocument/2006/relationships" xmlns:p="http://schemas.openxmlformats.org/presentationml/2006/main">
   <p:cSld>
@@ -4547,6 +4743,697 @@
       </p:grpSpPr>
       <p:sp>
         <p:nvSpPr>
+          <p:cNvPr id="2" name="Title 1">
+            <a:extLst>
+              <a:ext uri="{FF2B5EF4-FFF2-40B4-BE49-F238E27FC236}">
+                <a16:creationId xmlns:a16="http://schemas.microsoft.com/office/drawing/2014/main" id="{7312C6C0-04E5-294C-A93C-BA94E5B4ED1C}"/>
+              </a:ext>
+            </a:extLst>
+          </p:cNvPr>
+          <p:cNvSpPr>
+            <a:spLocks noGrp="1"/>
+          </p:cNvSpPr>
+          <p:nvPr>
+            <p:ph type="title"/>
+          </p:nvPr>
+        </p:nvSpPr>
+        <p:spPr>
+          <a:xfrm>
+            <a:off x="838200" y="108275"/>
+            <a:ext cx="10515600" cy="569823"/>
+          </a:xfrm>
+        </p:spPr>
+        <p:txBody>
+          <a:bodyPr>
+            <a:normAutofit fontScale="90000"/>
+          </a:bodyPr>
+          <a:lstStyle/>
+          <a:p>
+            <a:r>
+              <a:rPr lang="en-US" dirty="0"/>
+              <a:t>To do</a:t>
+            </a:r>
+          </a:p>
+        </p:txBody>
+      </p:sp>
+      <p:sp>
+        <p:nvSpPr>
+          <p:cNvPr id="3" name="Content Placeholder 2">
+            <a:extLst>
+              <a:ext uri="{FF2B5EF4-FFF2-40B4-BE49-F238E27FC236}">
+                <a16:creationId xmlns:a16="http://schemas.microsoft.com/office/drawing/2014/main" id="{F4A91C9E-4D19-6941-8AF7-02141CECFFC6}"/>
+              </a:ext>
+            </a:extLst>
+          </p:cNvPr>
+          <p:cNvSpPr>
+            <a:spLocks noGrp="1"/>
+          </p:cNvSpPr>
+          <p:nvPr>
+            <p:ph idx="1"/>
+          </p:nvPr>
+        </p:nvSpPr>
+        <p:spPr>
+          <a:xfrm>
+            <a:off x="838200" y="678098"/>
+            <a:ext cx="10515600" cy="5887089"/>
+          </a:xfrm>
+        </p:spPr>
+        <p:txBody>
+          <a:bodyPr>
+            <a:normAutofit/>
+          </a:bodyPr>
+          <a:lstStyle/>
+          <a:p>
+            <a:pPr>
+              <a:lnSpc>
+                <a:spcPct val="120000"/>
+              </a:lnSpc>
+              <a:spcBef>
+                <a:spcPts val="0"/>
+              </a:spcBef>
+            </a:pPr>
+            <a:r>
+              <a:rPr lang="en-US" dirty="0"/>
+              <a:t>n/a or non-legible value of THC --&gt; default = 0% (counsellor uses judgement)</a:t>
+            </a:r>
+          </a:p>
+          <a:p>
+            <a:pPr>
+              <a:lnSpc>
+                <a:spcPct val="120000"/>
+              </a:lnSpc>
+              <a:spcBef>
+                <a:spcPts val="0"/>
+              </a:spcBef>
+            </a:pPr>
+            <a:r>
+              <a:rPr lang="en-US" dirty="0"/>
+              <a:t>Add </a:t>
+            </a:r>
+            <a:r>
+              <a:rPr lang="en-US" dirty="0" err="1"/>
+              <a:t>terepens</a:t>
+            </a:r>
+            <a:endParaRPr lang="en-US" dirty="0"/>
+          </a:p>
+          <a:p>
+            <a:pPr>
+              <a:lnSpc>
+                <a:spcPct val="120000"/>
+              </a:lnSpc>
+              <a:spcBef>
+                <a:spcPts val="0"/>
+              </a:spcBef>
+            </a:pPr>
+            <a:r>
+              <a:rPr lang="en-US" dirty="0"/>
+              <a:t>Add to patient demographics: allergies</a:t>
+            </a:r>
+          </a:p>
+          <a:p>
+            <a:pPr>
+              <a:lnSpc>
+                <a:spcPct val="120000"/>
+              </a:lnSpc>
+              <a:spcBef>
+                <a:spcPts val="0"/>
+              </a:spcBef>
+            </a:pPr>
+            <a:r>
+              <a:rPr lang="en-US" dirty="0"/>
+              <a:t>MD includes g/day --&gt; counsellor converts to g/month</a:t>
+            </a:r>
+          </a:p>
+          <a:p>
+            <a:pPr>
+              <a:lnSpc>
+                <a:spcPct val="120000"/>
+              </a:lnSpc>
+              <a:spcBef>
+                <a:spcPts val="0"/>
+              </a:spcBef>
+            </a:pPr>
+            <a:r>
+              <a:rPr lang="en-US" dirty="0"/>
+              <a:t>On Pt. demographics possibly show duration *e.g. 6 </a:t>
+            </a:r>
+            <a:r>
+              <a:rPr lang="en-US" dirty="0" err="1"/>
+              <a:t>mos</a:t>
+            </a:r>
+            <a:r>
+              <a:rPr lang="en-US" dirty="0"/>
+              <a:t>" (doesn't actually impact counsellor in CRX; but is valuable for setting follow-up visit)</a:t>
+            </a:r>
+          </a:p>
+        </p:txBody>
+      </p:sp>
+    </p:spTree>
+    <p:extLst>
+      <p:ext uri="{BB962C8B-B14F-4D97-AF65-F5344CB8AC3E}">
+        <p14:creationId xmlns:p14="http://schemas.microsoft.com/office/powerpoint/2010/main" val="2106660363"/>
+      </p:ext>
+    </p:extLst>
+  </p:cSld>
+  <p:clrMapOvr>
+    <a:masterClrMapping/>
+  </p:clrMapOvr>
+</p:sld>
+</file>
+
+<file path=ppt/slides/slide4.xml><?xml version="1.0" encoding="utf-8"?>
+<p:sld xmlns:a="http://schemas.openxmlformats.org/drawingml/2006/main" xmlns:r="http://schemas.openxmlformats.org/officeDocument/2006/relationships" xmlns:p="http://schemas.openxmlformats.org/presentationml/2006/main">
+  <p:cSld>
+    <p:spTree>
+      <p:nvGrpSpPr>
+        <p:cNvPr id="1" name=""/>
+        <p:cNvGrpSpPr/>
+        <p:nvPr/>
+      </p:nvGrpSpPr>
+      <p:grpSpPr>
+        <a:xfrm>
+          <a:off x="0" y="0"/>
+          <a:ext cx="0" cy="0"/>
+          <a:chOff x="0" y="0"/>
+          <a:chExt cx="0" cy="0"/>
+        </a:xfrm>
+      </p:grpSpPr>
+      <p:sp>
+        <p:nvSpPr>
+          <p:cNvPr id="2" name="Title 1">
+            <a:extLst>
+              <a:ext uri="{FF2B5EF4-FFF2-40B4-BE49-F238E27FC236}">
+                <a16:creationId xmlns:a16="http://schemas.microsoft.com/office/drawing/2014/main" id="{7312C6C0-04E5-294C-A93C-BA94E5B4ED1C}"/>
+              </a:ext>
+            </a:extLst>
+          </p:cNvPr>
+          <p:cNvSpPr>
+            <a:spLocks noGrp="1"/>
+          </p:cNvSpPr>
+          <p:nvPr>
+            <p:ph type="title"/>
+          </p:nvPr>
+        </p:nvSpPr>
+        <p:spPr>
+          <a:xfrm>
+            <a:off x="838200" y="108275"/>
+            <a:ext cx="10515600" cy="569823"/>
+          </a:xfrm>
+        </p:spPr>
+        <p:txBody>
+          <a:bodyPr>
+            <a:normAutofit fontScale="90000"/>
+          </a:bodyPr>
+          <a:lstStyle/>
+          <a:p>
+            <a:r>
+              <a:rPr lang="en-US" dirty="0"/>
+              <a:t>CCC Feedback</a:t>
+            </a:r>
+          </a:p>
+        </p:txBody>
+      </p:sp>
+      <p:sp>
+        <p:nvSpPr>
+          <p:cNvPr id="3" name="Content Placeholder 2">
+            <a:extLst>
+              <a:ext uri="{FF2B5EF4-FFF2-40B4-BE49-F238E27FC236}">
+                <a16:creationId xmlns:a16="http://schemas.microsoft.com/office/drawing/2014/main" id="{F4A91C9E-4D19-6941-8AF7-02141CECFFC6}"/>
+              </a:ext>
+            </a:extLst>
+          </p:cNvPr>
+          <p:cNvSpPr>
+            <a:spLocks noGrp="1"/>
+          </p:cNvSpPr>
+          <p:nvPr>
+            <p:ph idx="1"/>
+          </p:nvPr>
+        </p:nvSpPr>
+        <p:spPr>
+          <a:xfrm>
+            <a:off x="838200" y="678098"/>
+            <a:ext cx="10515600" cy="5887089"/>
+          </a:xfrm>
+        </p:spPr>
+        <p:txBody>
+          <a:bodyPr>
+            <a:normAutofit fontScale="47500" lnSpcReduction="20000"/>
+          </a:bodyPr>
+          <a:lstStyle/>
+          <a:p>
+            <a:pPr marL="0" indent="0">
+              <a:lnSpc>
+                <a:spcPct val="120000"/>
+              </a:lnSpc>
+              <a:spcBef>
+                <a:spcPts val="0"/>
+              </a:spcBef>
+              <a:buNone/>
+            </a:pPr>
+            <a:r>
+              <a:rPr lang="en-US" dirty="0"/>
+              <a:t>FYI (no action required</a:t>
+            </a:r>
+          </a:p>
+          <a:p>
+            <a:pPr>
+              <a:lnSpc>
+                <a:spcPct val="120000"/>
+              </a:lnSpc>
+              <a:spcBef>
+                <a:spcPts val="0"/>
+              </a:spcBef>
+            </a:pPr>
+            <a:r>
+              <a:rPr lang="en-US" dirty="0"/>
+              <a:t>One-click renewal</a:t>
+            </a:r>
+          </a:p>
+          <a:p>
+            <a:pPr>
+              <a:lnSpc>
+                <a:spcPct val="120000"/>
+              </a:lnSpc>
+              <a:spcBef>
+                <a:spcPts val="0"/>
+              </a:spcBef>
+            </a:pPr>
+            <a:r>
+              <a:rPr lang="en-US" dirty="0"/>
+              <a:t>One-click registration</a:t>
+            </a:r>
+          </a:p>
+          <a:p>
+            <a:pPr>
+              <a:lnSpc>
+                <a:spcPct val="120000"/>
+              </a:lnSpc>
+              <a:spcBef>
+                <a:spcPts val="0"/>
+              </a:spcBef>
+            </a:pPr>
+            <a:r>
+              <a:rPr lang="en-US" dirty="0"/>
+              <a:t>Filter by medical document</a:t>
+            </a:r>
+          </a:p>
+          <a:p>
+            <a:pPr>
+              <a:lnSpc>
+                <a:spcPct val="120000"/>
+              </a:lnSpc>
+              <a:spcBef>
+                <a:spcPts val="0"/>
+              </a:spcBef>
+            </a:pPr>
+            <a:r>
+              <a:rPr lang="en-US" dirty="0"/>
+              <a:t>Patient gets exactly what they chose with the counsellor</a:t>
+            </a:r>
+          </a:p>
+          <a:p>
+            <a:pPr>
+              <a:lnSpc>
+                <a:spcPct val="120000"/>
+              </a:lnSpc>
+              <a:spcBef>
+                <a:spcPts val="0"/>
+              </a:spcBef>
+            </a:pPr>
+            <a:r>
+              <a:rPr lang="en-US" dirty="0"/>
+              <a:t>Adam: Consider removing contraindications as it could train counsellor to depend on it. (e.g. blood thinners are important to know)</a:t>
+            </a:r>
+          </a:p>
+          <a:p>
+            <a:pPr>
+              <a:lnSpc>
+                <a:spcPct val="120000"/>
+              </a:lnSpc>
+              <a:spcBef>
+                <a:spcPts val="0"/>
+              </a:spcBef>
+            </a:pPr>
+            <a:r>
+              <a:rPr lang="en-US" dirty="0"/>
+              <a:t>Automatically pull up the patient from Ora (CC prescriber is in patient context of Ora)</a:t>
+            </a:r>
+          </a:p>
+          <a:p>
+            <a:pPr>
+              <a:lnSpc>
+                <a:spcPct val="120000"/>
+              </a:lnSpc>
+              <a:spcBef>
+                <a:spcPts val="0"/>
+              </a:spcBef>
+            </a:pPr>
+            <a:r>
+              <a:rPr lang="en-US" dirty="0"/>
+              <a:t>Current: Locate patient by: phone number, email, full name</a:t>
+            </a:r>
+          </a:p>
+          <a:p>
+            <a:pPr>
+              <a:lnSpc>
+                <a:spcPct val="120000"/>
+              </a:lnSpc>
+              <a:spcBef>
+                <a:spcPts val="0"/>
+              </a:spcBef>
+            </a:pPr>
+            <a:r>
+              <a:rPr lang="en-US" dirty="0"/>
+              <a:t>Strain review: not being done by counsellors, but would be useful for data science (automate through email survey; option for counsellor to perform/skip/send email survey)</a:t>
+            </a:r>
+          </a:p>
+          <a:p>
+            <a:pPr>
+              <a:lnSpc>
+                <a:spcPct val="120000"/>
+              </a:lnSpc>
+              <a:spcBef>
+                <a:spcPts val="0"/>
+              </a:spcBef>
+            </a:pPr>
+            <a:r>
+              <a:rPr lang="en-US" dirty="0"/>
+              <a:t>Devon Kerr: populates DB (in-stock, price updates) every (ideally) morning; and oil conversion</a:t>
+            </a:r>
+          </a:p>
+          <a:p>
+            <a:pPr>
+              <a:lnSpc>
+                <a:spcPct val="120000"/>
+              </a:lnSpc>
+              <a:spcBef>
+                <a:spcPts val="0"/>
+              </a:spcBef>
+            </a:pPr>
+            <a:endParaRPr lang="en-US" dirty="0"/>
+          </a:p>
+          <a:p>
+            <a:pPr marL="0" indent="0">
+              <a:lnSpc>
+                <a:spcPct val="120000"/>
+              </a:lnSpc>
+              <a:spcBef>
+                <a:spcPts val="0"/>
+              </a:spcBef>
+              <a:buNone/>
+            </a:pPr>
+            <a:r>
+              <a:rPr lang="en-US" dirty="0"/>
+              <a:t>CC To do</a:t>
+            </a:r>
+          </a:p>
+          <a:p>
+            <a:pPr>
+              <a:lnSpc>
+                <a:spcPct val="120000"/>
+              </a:lnSpc>
+              <a:spcBef>
+                <a:spcPts val="0"/>
+              </a:spcBef>
+            </a:pPr>
+            <a:r>
+              <a:rPr lang="en-US" dirty="0"/>
+              <a:t>However, Dr/NP should not be allowed to enter "n/a" or non-numeric</a:t>
+            </a:r>
+          </a:p>
+          <a:p>
+            <a:pPr>
+              <a:lnSpc>
+                <a:spcPct val="120000"/>
+              </a:lnSpc>
+              <a:spcBef>
+                <a:spcPts val="0"/>
+              </a:spcBef>
+            </a:pPr>
+            <a:r>
+              <a:rPr lang="en-US" dirty="0"/>
+              <a:t>6 or 7 basic terpenes (NP Shirley know terpenes)</a:t>
+            </a:r>
+          </a:p>
+          <a:p>
+            <a:pPr>
+              <a:lnSpc>
+                <a:spcPct val="120000"/>
+              </a:lnSpc>
+              <a:spcBef>
+                <a:spcPts val="0"/>
+              </a:spcBef>
+            </a:pPr>
+            <a:r>
+              <a:rPr lang="en-US" dirty="0"/>
+              <a:t>formats: flower, oil, pills/capsule, patient ready/decarb, edibles, vapes</a:t>
+            </a:r>
+          </a:p>
+          <a:p>
+            <a:pPr>
+              <a:lnSpc>
+                <a:spcPct val="120000"/>
+              </a:lnSpc>
+              <a:spcBef>
+                <a:spcPts val="0"/>
+              </a:spcBef>
+            </a:pPr>
+            <a:r>
+              <a:rPr lang="en-US" dirty="0"/>
+              <a:t>Desire to back-order out-of-stock product and/or for LP to refill 1~2 </a:t>
+            </a:r>
+            <a:r>
+              <a:rPr lang="en-US" dirty="0" err="1"/>
+              <a:t>wks</a:t>
+            </a:r>
+            <a:r>
+              <a:rPr lang="en-US" dirty="0"/>
+              <a:t> before duration ends</a:t>
+            </a:r>
+          </a:p>
+          <a:p>
+            <a:pPr>
+              <a:lnSpc>
+                <a:spcPct val="120000"/>
+              </a:lnSpc>
+              <a:spcBef>
+                <a:spcPts val="0"/>
+              </a:spcBef>
+            </a:pPr>
+            <a:r>
+              <a:rPr lang="en-US" dirty="0"/>
+              <a:t>Add filter: "compassionate pricing" (filters out LPs that don't offer compassionate pricing)</a:t>
+            </a:r>
+          </a:p>
+          <a:p>
+            <a:pPr>
+              <a:lnSpc>
+                <a:spcPct val="120000"/>
+              </a:lnSpc>
+              <a:spcBef>
+                <a:spcPts val="0"/>
+              </a:spcBef>
+            </a:pPr>
+            <a:r>
+              <a:rPr lang="en-US" dirty="0"/>
+              <a:t>encouraged not to specify strain; CBD is open; THC is important variable</a:t>
+            </a:r>
+          </a:p>
+          <a:p>
+            <a:pPr>
+              <a:lnSpc>
+                <a:spcPct val="120000"/>
+              </a:lnSpc>
+              <a:spcBef>
+                <a:spcPts val="0"/>
+              </a:spcBef>
+            </a:pPr>
+            <a:r>
+              <a:rPr lang="en-US" dirty="0"/>
+              <a:t>Need a per product oil to dried %THC conversion</a:t>
+            </a:r>
+          </a:p>
+          <a:p>
+            <a:pPr>
+              <a:lnSpc>
+                <a:spcPct val="120000"/>
+              </a:lnSpc>
+              <a:spcBef>
+                <a:spcPts val="0"/>
+              </a:spcBef>
+            </a:pPr>
+            <a:r>
+              <a:rPr lang="en-US" dirty="0"/>
+              <a:t>Could use same product for both night and day (dilute oil more in the day than at night)</a:t>
+            </a:r>
+          </a:p>
+          <a:p>
+            <a:pPr>
+              <a:lnSpc>
+                <a:spcPct val="120000"/>
+              </a:lnSpc>
+              <a:spcBef>
+                <a:spcPts val="0"/>
+              </a:spcBef>
+            </a:pPr>
+            <a:r>
+              <a:rPr lang="en-US" dirty="0"/>
+              <a:t>Default order size based on 5gm for dried or 1 bottle for oil</a:t>
+            </a:r>
+          </a:p>
+          <a:p>
+            <a:pPr>
+              <a:lnSpc>
+                <a:spcPct val="120000"/>
+              </a:lnSpc>
+              <a:spcBef>
+                <a:spcPts val="0"/>
+              </a:spcBef>
+            </a:pPr>
+            <a:r>
+              <a:rPr lang="en-US" dirty="0"/>
+              <a:t>Roe: larger font</a:t>
+            </a:r>
+          </a:p>
+          <a:p>
+            <a:pPr>
+              <a:lnSpc>
+                <a:spcPct val="120000"/>
+              </a:lnSpc>
+              <a:spcBef>
+                <a:spcPts val="0"/>
+              </a:spcBef>
+            </a:pPr>
+            <a:r>
+              <a:rPr lang="en-US" dirty="0"/>
+              <a:t>Iterate through multiple MDs in one session. (CRX requires logging out and logging back in)</a:t>
+            </a:r>
+          </a:p>
+          <a:p>
+            <a:pPr>
+              <a:lnSpc>
+                <a:spcPct val="120000"/>
+              </a:lnSpc>
+              <a:spcBef>
+                <a:spcPts val="0"/>
+              </a:spcBef>
+            </a:pPr>
+            <a:r>
+              <a:rPr lang="en-US" dirty="0"/>
+              <a:t>Pts are now averaging 2~3 MDs each</a:t>
+            </a:r>
+          </a:p>
+          <a:p>
+            <a:pPr>
+              <a:lnSpc>
+                <a:spcPct val="120000"/>
+              </a:lnSpc>
+              <a:spcBef>
+                <a:spcPts val="0"/>
+              </a:spcBef>
+            </a:pPr>
+            <a:r>
+              <a:rPr lang="en-US" dirty="0"/>
+              <a:t>As each MD's order is completing, mark the MD as completed and iterate to next one</a:t>
+            </a:r>
+          </a:p>
+          <a:p>
+            <a:pPr>
+              <a:lnSpc>
+                <a:spcPct val="120000"/>
+              </a:lnSpc>
+              <a:spcBef>
+                <a:spcPts val="0"/>
+              </a:spcBef>
+            </a:pPr>
+            <a:r>
+              <a:rPr lang="en-US" dirty="0"/>
+              <a:t>Consider allowing counsellor to select follow-up appointment time with patient</a:t>
+            </a:r>
+          </a:p>
+          <a:p>
+            <a:pPr>
+              <a:lnSpc>
+                <a:spcPct val="120000"/>
+              </a:lnSpc>
+              <a:spcBef>
+                <a:spcPts val="0"/>
+              </a:spcBef>
+            </a:pPr>
+            <a:r>
+              <a:rPr lang="en-US" dirty="0"/>
+              <a:t>Patient signing option (</a:t>
+            </a:r>
+            <a:r>
+              <a:rPr lang="en-US" dirty="0" err="1"/>
+              <a:t>docusign</a:t>
+            </a:r>
+            <a:r>
+              <a:rPr lang="en-US" dirty="0"/>
+              <a:t> or express consent or...) – Kim currently signs </a:t>
+            </a:r>
+            <a:r>
+              <a:rPr lang="en-US" dirty="0" err="1"/>
+              <a:t>o.b.o.</a:t>
+            </a:r>
+            <a:r>
+              <a:rPr lang="en-US" dirty="0"/>
+              <a:t> </a:t>
+            </a:r>
+            <a:r>
+              <a:rPr lang="en-US"/>
+              <a:t>pt.</a:t>
+            </a:r>
+            <a:endParaRPr lang="en-US" dirty="0"/>
+          </a:p>
+          <a:p>
+            <a:pPr>
+              <a:lnSpc>
+                <a:spcPct val="120000"/>
+              </a:lnSpc>
+              <a:spcBef>
+                <a:spcPts val="0"/>
+              </a:spcBef>
+            </a:pPr>
+            <a:r>
+              <a:rPr lang="en-US" dirty="0"/>
+              <a:t>ODSB for Vape (understand from Nasir / Kim)</a:t>
+            </a:r>
+          </a:p>
+        </p:txBody>
+      </p:sp>
+    </p:spTree>
+    <p:extLst>
+      <p:ext uri="{BB962C8B-B14F-4D97-AF65-F5344CB8AC3E}">
+        <p14:creationId xmlns:p14="http://schemas.microsoft.com/office/powerpoint/2010/main" val="1688005659"/>
+      </p:ext>
+    </p:extLst>
+  </p:cSld>
+  <p:clrMapOvr>
+    <a:masterClrMapping/>
+  </p:clrMapOvr>
+</p:sld>
+</file>
+
+<file path=ppt/slides/slide5.xml><?xml version="1.0" encoding="utf-8"?>
+<p:sld xmlns:a="http://schemas.openxmlformats.org/drawingml/2006/main" xmlns:r="http://schemas.openxmlformats.org/officeDocument/2006/relationships" xmlns:p="http://schemas.openxmlformats.org/presentationml/2006/main">
+  <p:cSld>
+    <p:spTree>
+      <p:nvGrpSpPr>
+        <p:cNvPr id="1" name=""/>
+        <p:cNvGrpSpPr/>
+        <p:nvPr/>
+      </p:nvGrpSpPr>
+      <p:grpSpPr>
+        <a:xfrm>
+          <a:off x="0" y="0"/>
+          <a:ext cx="0" cy="0"/>
+          <a:chOff x="0" y="0"/>
+          <a:chExt cx="0" cy="0"/>
+        </a:xfrm>
+      </p:grpSpPr>
+      <p:sp>
+        <p:nvSpPr>
           <p:cNvPr id="2" name="TextBox 1">
             <a:extLst>
               <a:ext uri="{FF2B5EF4-FFF2-40B4-BE49-F238E27FC236}">
@@ -4603,7 +5490,7 @@
 </p:sld>
 </file>
 
-<file path=ppt/slides/slide4.xml><?xml version="1.0" encoding="utf-8"?>
+<file path=ppt/slides/slide6.xml><?xml version="1.0" encoding="utf-8"?>
 <p:sld xmlns:a="http://schemas.openxmlformats.org/drawingml/2006/main" xmlns:r="http://schemas.openxmlformats.org/officeDocument/2006/relationships" xmlns:p="http://schemas.openxmlformats.org/presentationml/2006/main">
   <p:cSld>
     <p:spTree>
@@ -4680,7 +5567,7 @@
 </p:sld>
 </file>
 
-<file path=ppt/slides/slide5.xml><?xml version="1.0" encoding="utf-8"?>
+<file path=ppt/slides/slide7.xml><?xml version="1.0" encoding="utf-8"?>
 <p:sld xmlns:a="http://schemas.openxmlformats.org/drawingml/2006/main" xmlns:r="http://schemas.openxmlformats.org/officeDocument/2006/relationships" xmlns:p="http://schemas.openxmlformats.org/presentationml/2006/main">
   <p:cSld>
     <p:spTree>
@@ -4744,7 +5631,7 @@
 </p:sld>
 </file>
 
-<file path=ppt/slides/slide6.xml><?xml version="1.0" encoding="utf-8"?>
+<file path=ppt/slides/slide8.xml><?xml version="1.0" encoding="utf-8"?>
 <p:sld xmlns:a="http://schemas.openxmlformats.org/drawingml/2006/main" xmlns:r="http://schemas.openxmlformats.org/officeDocument/2006/relationships" xmlns:p="http://schemas.openxmlformats.org/presentationml/2006/main">
   <p:cSld>
     <p:spTree>
@@ -4808,7 +5695,7 @@
 </p:sld>
 </file>
 
-<file path=ppt/slides/slide7.xml><?xml version="1.0" encoding="utf-8"?>
+<file path=ppt/slides/slide9.xml><?xml version="1.0" encoding="utf-8"?>
 <p:sld xmlns:a="http://schemas.openxmlformats.org/drawingml/2006/main" xmlns:r="http://schemas.openxmlformats.org/officeDocument/2006/relationships" xmlns:p="http://schemas.openxmlformats.org/presentationml/2006/main">
   <p:cSld>
     <p:spTree>
@@ -4863,135 +5750,6 @@
     <p:extLst>
       <p:ext uri="{BB962C8B-B14F-4D97-AF65-F5344CB8AC3E}">
         <p14:creationId xmlns:p14="http://schemas.microsoft.com/office/powerpoint/2010/main" val="1199012680"/>
-      </p:ext>
-    </p:extLst>
-  </p:cSld>
-  <p:clrMapOvr>
-    <a:masterClrMapping/>
-  </p:clrMapOvr>
-</p:sld>
-</file>
-
-<file path=ppt/slides/slide8.xml><?xml version="1.0" encoding="utf-8"?>
-<p:sld xmlns:a="http://schemas.openxmlformats.org/drawingml/2006/main" xmlns:r="http://schemas.openxmlformats.org/officeDocument/2006/relationships" xmlns:p="http://schemas.openxmlformats.org/presentationml/2006/main">
-  <p:cSld>
-    <p:spTree>
-      <p:nvGrpSpPr>
-        <p:cNvPr id="1" name=""/>
-        <p:cNvGrpSpPr/>
-        <p:nvPr/>
-      </p:nvGrpSpPr>
-      <p:grpSpPr>
-        <a:xfrm>
-          <a:off x="0" y="0"/>
-          <a:ext cx="0" cy="0"/>
-          <a:chOff x="0" y="0"/>
-          <a:chExt cx="0" cy="0"/>
-        </a:xfrm>
-      </p:grpSpPr>
-      <p:pic>
-        <p:nvPicPr>
-          <p:cNvPr id="2" name="Picture 1" descr="A picture containing cabinet, screenshot&#10;&#10;Description automatically generated">
-            <a:extLst>
-              <a:ext uri="{FF2B5EF4-FFF2-40B4-BE49-F238E27FC236}">
-                <a16:creationId xmlns:a16="http://schemas.microsoft.com/office/drawing/2014/main" id="{68B15E08-AE88-1F42-BB37-607A3B619BD3}"/>
-              </a:ext>
-            </a:extLst>
-          </p:cNvPr>
-          <p:cNvPicPr/>
-          <p:nvPr/>
-        </p:nvPicPr>
-        <p:blipFill>
-          <a:blip r:embed="rId2" cstate="email">
-            <a:extLst>
-              <a:ext uri="{28A0092B-C50C-407E-A947-70E740481C1C}">
-                <a14:useLocalDpi xmlns:a14="http://schemas.microsoft.com/office/drawing/2010/main"/>
-              </a:ext>
-            </a:extLst>
-          </a:blip>
-          <a:stretch>
-            <a:fillRect/>
-          </a:stretch>
-        </p:blipFill>
-        <p:spPr>
-          <a:xfrm>
-            <a:off x="1650356" y="2106707"/>
-            <a:ext cx="8891288" cy="2644588"/>
-          </a:xfrm>
-          <a:prstGeom prst="rect">
-            <a:avLst/>
-          </a:prstGeom>
-        </p:spPr>
-      </p:pic>
-    </p:spTree>
-    <p:extLst>
-      <p:ext uri="{BB962C8B-B14F-4D97-AF65-F5344CB8AC3E}">
-        <p14:creationId xmlns:p14="http://schemas.microsoft.com/office/powerpoint/2010/main" val="955394993"/>
-      </p:ext>
-    </p:extLst>
-  </p:cSld>
-  <p:clrMapOvr>
-    <a:masterClrMapping/>
-  </p:clrMapOvr>
-</p:sld>
-</file>
-
-<file path=ppt/slides/slide9.xml><?xml version="1.0" encoding="utf-8"?>
-<p:sld xmlns:a="http://schemas.openxmlformats.org/drawingml/2006/main" xmlns:r="http://schemas.openxmlformats.org/officeDocument/2006/relationships" xmlns:p="http://schemas.openxmlformats.org/presentationml/2006/main">
-  <p:cSld>
-    <p:spTree>
-      <p:nvGrpSpPr>
-        <p:cNvPr id="1" name=""/>
-        <p:cNvGrpSpPr/>
-        <p:nvPr/>
-      </p:nvGrpSpPr>
-      <p:grpSpPr>
-        <a:xfrm>
-          <a:off x="0" y="0"/>
-          <a:ext cx="0" cy="0"/>
-          <a:chOff x="0" y="0"/>
-          <a:chExt cx="0" cy="0"/>
-        </a:xfrm>
-      </p:grpSpPr>
-      <p:pic>
-        <p:nvPicPr>
-          <p:cNvPr id="2" name="Picture 1">
-            <a:extLst>
-              <a:ext uri="{FF2B5EF4-FFF2-40B4-BE49-F238E27FC236}">
-                <a16:creationId xmlns:a16="http://schemas.microsoft.com/office/drawing/2014/main" id="{45B43790-A0AA-5E4A-8FC9-8E2E000F7563}"/>
-              </a:ext>
-            </a:extLst>
-          </p:cNvPr>
-          <p:cNvPicPr>
-            <a:picLocks noChangeAspect="1"/>
-          </p:cNvPicPr>
-          <p:nvPr/>
-        </p:nvPicPr>
-        <p:blipFill rotWithShape="1">
-          <a:blip r:embed="rId2" cstate="email">
-            <a:extLst>
-              <a:ext uri="{28A0092B-C50C-407E-A947-70E740481C1C}">
-                <a14:useLocalDpi xmlns:a14="http://schemas.microsoft.com/office/drawing/2010/main"/>
-              </a:ext>
-            </a:extLst>
-          </a:blip>
-          <a:srcRect/>
-          <a:stretch/>
-        </p:blipFill>
-        <p:spPr>
-          <a:xfrm>
-            <a:off x="1524001" y="947855"/>
-            <a:ext cx="9120556" cy="5112287"/>
-          </a:xfrm>
-          <a:prstGeom prst="rect">
-            <a:avLst/>
-          </a:prstGeom>
-        </p:spPr>
-      </p:pic>
-    </p:spTree>
-    <p:extLst>
-      <p:ext uri="{BB962C8B-B14F-4D97-AF65-F5344CB8AC3E}">
-        <p14:creationId xmlns:p14="http://schemas.microsoft.com/office/powerpoint/2010/main" val="1206427728"/>
       </p:ext>
     </p:extLst>
   </p:cSld>

</xml_diff>

<commit_message>
Prettified table; stub of tabbar
</commit_message>
<xml_diff>
--- a/HC cannabis Rx.pptx
+++ b/HC cannabis Rx.pptx
@@ -128,7 +128,7 @@
 <file path=ppt/revisionInfo.xml><?xml version="1.0" encoding="utf-8"?>
 <p1510:revInfo xmlns:a="http://schemas.openxmlformats.org/drawingml/2006/main" xmlns:r="http://schemas.openxmlformats.org/officeDocument/2006/relationships" xmlns:p1510="http://schemas.microsoft.com/office/powerpoint/2015/10/main">
   <p1510:revLst>
-    <p1510:client id="{D9A4A140-E193-C04B-A0D9-432644840A51}" v="23" dt="2020-01-18T13:03:56.461"/>
+    <p1510:client id="{D9A4A140-E193-C04B-A0D9-432644840A51}" v="24" dt="2020-01-21T17:50:34.564"/>
   </p1510:revLst>
 </p1510:revInfo>
 </file>
@@ -138,7 +138,7 @@
   <pc:docChgLst>
     <pc:chgData name="Adam Cole" userId="725ce5a55aa425b7" providerId="LiveId" clId="{D9A4A140-E193-C04B-A0D9-432644840A51}"/>
     <pc:docChg chg="undo custSel addSld modSld">
-      <pc:chgData name="Adam Cole" userId="725ce5a55aa425b7" providerId="LiveId" clId="{D9A4A140-E193-C04B-A0D9-432644840A51}" dt="2020-01-18T13:04:26.163" v="343" actId="20577"/>
+      <pc:chgData name="Adam Cole" userId="725ce5a55aa425b7" providerId="LiveId" clId="{D9A4A140-E193-C04B-A0D9-432644840A51}" dt="2020-01-21T17:50:34.562" v="344"/>
       <pc:docMkLst>
         <pc:docMk/>
       </pc:docMkLst>
@@ -166,7 +166,7 @@
         </pc:spChg>
       </pc:sldChg>
       <pc:sldChg chg="modSp add">
-        <pc:chgData name="Adam Cole" userId="725ce5a55aa425b7" providerId="LiveId" clId="{D9A4A140-E193-C04B-A0D9-432644840A51}" dt="2020-01-18T13:04:26.163" v="343" actId="20577"/>
+        <pc:chgData name="Adam Cole" userId="725ce5a55aa425b7" providerId="LiveId" clId="{D9A4A140-E193-C04B-A0D9-432644840A51}" dt="2020-01-21T17:50:34.562" v="344"/>
         <pc:sldMkLst>
           <pc:docMk/>
           <pc:sldMk cId="1688005659" sldId="266"/>
@@ -180,7 +180,7 @@
           </ac:spMkLst>
         </pc:spChg>
         <pc:spChg chg="mod">
-          <ac:chgData name="Adam Cole" userId="725ce5a55aa425b7" providerId="LiveId" clId="{D9A4A140-E193-C04B-A0D9-432644840A51}" dt="2020-01-18T13:04:26.163" v="343" actId="20577"/>
+          <ac:chgData name="Adam Cole" userId="725ce5a55aa425b7" providerId="LiveId" clId="{D9A4A140-E193-C04B-A0D9-432644840A51}" dt="2020-01-21T17:50:34.562" v="344"/>
           <ac:spMkLst>
             <pc:docMk/>
             <pc:sldMk cId="1688005659" sldId="266"/>
@@ -5378,13 +5378,8 @@
             </a:r>
             <a:r>
               <a:rPr lang="en-US" dirty="0"/>
-              <a:t> </a:t>
-            </a:r>
-            <a:r>
-              <a:rPr lang="en-US"/>
-              <a:t>pt.</a:t>
-            </a:r>
-            <a:endParaRPr lang="en-US" dirty="0"/>
+              <a:t> pt.</a:t>
+            </a:r>
           </a:p>
           <a:p>
             <a:pPr>

</xml_diff>

<commit_message>
Add Details and Prescription tabs
</commit_message>
<xml_diff>
--- a/HC cannabis Rx.pptx
+++ b/HC cannabis Rx.pptx
@@ -137,13 +137,13 @@
 <pc:chgInfo xmlns:a="http://schemas.openxmlformats.org/drawingml/2006/main" xmlns:r="http://schemas.openxmlformats.org/officeDocument/2006/relationships" xmlns:ac="http://schemas.microsoft.com/office/drawing/2013/main/command" xmlns:pc="http://schemas.microsoft.com/office/powerpoint/2013/main/command">
   <pc:docChgLst>
     <pc:chgData name="Adam Cole" userId="725ce5a55aa425b7" providerId="LiveId" clId="{D9A4A140-E193-C04B-A0D9-432644840A51}"/>
-    <pc:docChg chg="undo custSel addSld modSld">
-      <pc:chgData name="Adam Cole" userId="725ce5a55aa425b7" providerId="LiveId" clId="{D9A4A140-E193-C04B-A0D9-432644840A51}" dt="2020-01-21T17:50:34.562" v="344"/>
+    <pc:docChg chg="undo redo custSel addSld modSld">
+      <pc:chgData name="Adam Cole" userId="725ce5a55aa425b7" providerId="LiveId" clId="{D9A4A140-E193-C04B-A0D9-432644840A51}" dt="2020-01-22T01:52:55.688" v="511" actId="20577"/>
       <pc:docMkLst>
         <pc:docMk/>
       </pc:docMkLst>
       <pc:sldChg chg="modSp add">
-        <pc:chgData name="Adam Cole" userId="725ce5a55aa425b7" providerId="LiveId" clId="{D9A4A140-E193-C04B-A0D9-432644840A51}" dt="2020-01-18T13:03:27.747" v="296" actId="27636"/>
+        <pc:chgData name="Adam Cole" userId="725ce5a55aa425b7" providerId="LiveId" clId="{D9A4A140-E193-C04B-A0D9-432644840A51}" dt="2020-01-22T01:52:55.688" v="511" actId="20577"/>
         <pc:sldMkLst>
           <pc:docMk/>
           <pc:sldMk cId="2106660363" sldId="265"/>
@@ -157,7 +157,7 @@
           </ac:spMkLst>
         </pc:spChg>
         <pc:spChg chg="mod">
-          <ac:chgData name="Adam Cole" userId="725ce5a55aa425b7" providerId="LiveId" clId="{D9A4A140-E193-C04B-A0D9-432644840A51}" dt="2020-01-18T13:03:27.747" v="296" actId="27636"/>
+          <ac:chgData name="Adam Cole" userId="725ce5a55aa425b7" providerId="LiveId" clId="{D9A4A140-E193-C04B-A0D9-432644840A51}" dt="2020-01-22T01:52:55.688" v="511" actId="20577"/>
           <ac:spMkLst>
             <pc:docMk/>
             <pc:sldMk cId="2106660363" sldId="265"/>
@@ -4800,7 +4800,7 @@
         </p:spPr>
         <p:txBody>
           <a:bodyPr>
-            <a:normAutofit/>
+            <a:normAutofit lnSpcReduction="10000"/>
           </a:bodyPr>
           <a:lstStyle/>
           <a:p>
@@ -4860,9 +4860,26 @@
               </a:spcBef>
             </a:pPr>
             <a:r>
-              <a:rPr lang="en-US" dirty="0"/>
+              <a:rPr lang="en-US" dirty="0">
+                <a:highlight>
+                  <a:srgbClr val="FFFF00"/>
+                </a:highlight>
+              </a:rPr>
               <a:t>MD includes g/day --&gt; counsellor converts to g/month</a:t>
             </a:r>
+            <a:r>
+              <a:rPr lang="en-US">
+                <a:highlight>
+                  <a:srgbClr val="FFFF00"/>
+                </a:highlight>
+              </a:rPr>
+              <a:t>, duration</a:t>
+            </a:r>
+            <a:endParaRPr lang="en-US" dirty="0">
+              <a:highlight>
+                <a:srgbClr val="FFFF00"/>
+              </a:highlight>
+            </a:endParaRPr>
           </a:p>
           <a:p>
             <a:pPr>
@@ -4884,6 +4901,64 @@
             <a:r>
               <a:rPr lang="en-US" dirty="0"/>
               <a:t>" (doesn't actually impact counsellor in CRX; but is valuable for setting follow-up visit)</a:t>
+            </a:r>
+          </a:p>
+          <a:p>
+            <a:pPr>
+              <a:lnSpc>
+                <a:spcPct val="120000"/>
+              </a:lnSpc>
+              <a:spcBef>
+                <a:spcPts val="0"/>
+              </a:spcBef>
+            </a:pPr>
+            <a:r>
+              <a:rPr lang="en-US" dirty="0">
+                <a:highlight>
+                  <a:srgbClr val="FFFF00"/>
+                </a:highlight>
+              </a:rPr>
+              <a:t>Order: amount, signature</a:t>
+            </a:r>
+          </a:p>
+          <a:p>
+            <a:pPr marL="0" indent="0">
+              <a:lnSpc>
+                <a:spcPct val="120000"/>
+              </a:lnSpc>
+              <a:spcBef>
+                <a:spcPts val="0"/>
+              </a:spcBef>
+              <a:buNone/>
+            </a:pPr>
+            <a:endParaRPr lang="en-US" dirty="0"/>
+          </a:p>
+          <a:p>
+            <a:pPr>
+              <a:lnSpc>
+                <a:spcPct val="120000"/>
+              </a:lnSpc>
+              <a:spcBef>
+                <a:spcPts val="0"/>
+              </a:spcBef>
+            </a:pPr>
+            <a:r>
+              <a:rPr lang="en-US" dirty="0"/>
+              <a:t>Compare product A &amp; product B</a:t>
+            </a:r>
+          </a:p>
+          <a:p>
+            <a:pPr>
+              <a:lnSpc>
+                <a:spcPct val="120000"/>
+              </a:lnSpc>
+              <a:spcBef>
+                <a:spcPts val="0"/>
+              </a:spcBef>
+            </a:pPr>
+            <a:r>
+              <a:rPr lang="en-US" dirty="0"/>
+              <a:t>Filters: highest rated for {pain, insomnia, anxiety, depression,…}</a:t>
             </a:r>
           </a:p>
         </p:txBody>

</xml_diff>

<commit_message>
Stub for advanced search
</commit_message>
<xml_diff>
--- a/HC cannabis Rx.pptx
+++ b/HC cannabis Rx.pptx
@@ -138,12 +138,12 @@
   <pc:docChgLst>
     <pc:chgData name="Adam Cole" userId="725ce5a55aa425b7" providerId="LiveId" clId="{D9A4A140-E193-C04B-A0D9-432644840A51}"/>
     <pc:docChg chg="undo redo custSel addSld modSld">
-      <pc:chgData name="Adam Cole" userId="725ce5a55aa425b7" providerId="LiveId" clId="{D9A4A140-E193-C04B-A0D9-432644840A51}" dt="2020-01-22T01:52:55.688" v="511" actId="20577"/>
+      <pc:chgData name="Adam Cole" userId="725ce5a55aa425b7" providerId="LiveId" clId="{D9A4A140-E193-C04B-A0D9-432644840A51}" dt="2020-01-23T03:38:15.487" v="603" actId="400"/>
       <pc:docMkLst>
         <pc:docMk/>
       </pc:docMkLst>
       <pc:sldChg chg="modSp add">
-        <pc:chgData name="Adam Cole" userId="725ce5a55aa425b7" providerId="LiveId" clId="{D9A4A140-E193-C04B-A0D9-432644840A51}" dt="2020-01-22T01:52:55.688" v="511" actId="20577"/>
+        <pc:chgData name="Adam Cole" userId="725ce5a55aa425b7" providerId="LiveId" clId="{D9A4A140-E193-C04B-A0D9-432644840A51}" dt="2020-01-23T03:38:15.487" v="603" actId="400"/>
         <pc:sldMkLst>
           <pc:docMk/>
           <pc:sldMk cId="2106660363" sldId="265"/>
@@ -157,7 +157,7 @@
           </ac:spMkLst>
         </pc:spChg>
         <pc:spChg chg="mod">
-          <ac:chgData name="Adam Cole" userId="725ce5a55aa425b7" providerId="LiveId" clId="{D9A4A140-E193-C04B-A0D9-432644840A51}" dt="2020-01-22T01:52:55.688" v="511" actId="20577"/>
+          <ac:chgData name="Adam Cole" userId="725ce5a55aa425b7" providerId="LiveId" clId="{D9A4A140-E193-C04B-A0D9-432644840A51}" dt="2020-01-23T03:38:15.487" v="603" actId="400"/>
           <ac:spMkLst>
             <pc:docMk/>
             <pc:sldMk cId="2106660363" sldId="265"/>
@@ -4800,7 +4800,7 @@
         </p:spPr>
         <p:txBody>
           <a:bodyPr>
-            <a:normAutofit lnSpcReduction="10000"/>
+            <a:normAutofit fontScale="92500"/>
           </a:bodyPr>
           <a:lstStyle/>
           <a:p>
@@ -4834,7 +4834,34 @@
               <a:rPr lang="en-US" dirty="0" err="1"/>
               <a:t>terepens</a:t>
             </a:r>
-            <a:endParaRPr lang="en-US" dirty="0"/>
+            <a:r>
+              <a:rPr lang="en-US" dirty="0"/>
+              <a:t> (</a:t>
+            </a:r>
+            <a:r>
+              <a:rPr lang="en-US" strike="sngStrike" dirty="0"/>
+              <a:t>add column for </a:t>
+            </a:r>
+            <a:r>
+              <a:rPr lang="en-US" strike="sngStrike" dirty="0" err="1"/>
+              <a:t>terepens</a:t>
+            </a:r>
+            <a:r>
+              <a:rPr lang="en-US" strike="sngStrike" dirty="0"/>
+              <a:t> “primary </a:t>
+            </a:r>
+            <a:r>
+              <a:rPr lang="en-US" strike="sngStrike" dirty="0" err="1"/>
+              <a:t>terepen</a:t>
+            </a:r>
+            <a:r>
+              <a:rPr lang="en-US" strike="sngStrike" dirty="0"/>
+              <a:t>”</a:t>
+            </a:r>
+            <a:r>
+              <a:rPr lang="en-US" dirty="0"/>
+              <a:t>)</a:t>
+            </a:r>
           </a:p>
           <a:p>
             <a:pPr>
@@ -4860,26 +4887,9 @@
               </a:spcBef>
             </a:pPr>
             <a:r>
-              <a:rPr lang="en-US" dirty="0">
-                <a:highlight>
-                  <a:srgbClr val="FFFF00"/>
-                </a:highlight>
-              </a:rPr>
-              <a:t>MD includes g/day --&gt; counsellor converts to g/month</a:t>
-            </a:r>
-            <a:r>
-              <a:rPr lang="en-US">
-                <a:highlight>
-                  <a:srgbClr val="FFFF00"/>
-                </a:highlight>
-              </a:rPr>
-              <a:t>, duration</a:t>
-            </a:r>
-            <a:endParaRPr lang="en-US" dirty="0">
-              <a:highlight>
-                <a:srgbClr val="FFFF00"/>
-              </a:highlight>
-            </a:endParaRPr>
+              <a:rPr lang="en-US" strike="sngStrike" dirty="0"/>
+              <a:t>MD includes g/day --&gt; counsellor converts to g/month, duration</a:t>
+            </a:r>
           </a:p>
           <a:p>
             <a:pPr>
@@ -4919,6 +4929,20 @@
                 </a:highlight>
               </a:rPr>
               <a:t>Order: amount, signature</a:t>
+            </a:r>
+          </a:p>
+          <a:p>
+            <a:pPr>
+              <a:lnSpc>
+                <a:spcPct val="120000"/>
+              </a:lnSpc>
+              <a:spcBef>
+                <a:spcPts val="0"/>
+              </a:spcBef>
+            </a:pPr>
+            <a:r>
+              <a:rPr lang="en-US" strike="sngStrike" dirty="0"/>
+              <a:t>Sort with Aurora at top</a:t>
             </a:r>
           </a:p>
           <a:p>

</xml_diff>